<commit_message>
Aligments and more primers
Aligments for ASAT3 chr 11 and Chr 7, and upload of primer sequences for Chr 7 ASAT3
</commit_message>
<xml_diff>
--- a/Primer design.pptx
+++ b/Primer design.pptx
@@ -8,8 +8,9 @@
     <p:sldId id="256" r:id="rId2"/>
     <p:sldId id="257" r:id="rId3"/>
     <p:sldId id="258" r:id="rId4"/>
-    <p:sldId id="259" r:id="rId5"/>
-    <p:sldId id="260" r:id="rId6"/>
+    <p:sldId id="261" r:id="rId5"/>
+    <p:sldId id="259" r:id="rId6"/>
+    <p:sldId id="260" r:id="rId7"/>
   </p:sldIdLst>
   <p:sldSz cx="12192000" cy="6858000"/>
   <p:notesSz cx="6858000" cy="9144000"/>
@@ -108,7 +109,79 @@
       </a:defRPr>
     </a:lvl9pPr>
   </p:defaultTextStyle>
+  <p:extLst>
+    <p:ext uri="{EFAFB233-063F-42B5-8137-9DF3F51BA10A}">
+      <p15:sldGuideLst xmlns:p15="http://schemas.microsoft.com/office/powerpoint/2012/main"/>
+    </p:ext>
+  </p:extLst>
 </p:presentation>
+</file>
+
+<file path=ppt/changesInfos/changesInfo1.xml><?xml version="1.0" encoding="utf-8"?>
+<pc:chgInfo xmlns:a="http://schemas.openxmlformats.org/drawingml/2006/main" xmlns:r="http://schemas.openxmlformats.org/officeDocument/2006/relationships" xmlns:ac="http://schemas.microsoft.com/office/drawing/2013/main/command" xmlns:pc="http://schemas.microsoft.com/office/powerpoint/2013/main/command">
+  <pc:docChgLst>
+    <pc:chgData name="gsierrar14@outlook.com" userId="fb2f282ce878086b" providerId="LiveId" clId="{9B9C0534-58FC-4869-9946-ACB12500E633}"/>
+    <pc:docChg chg="addSld delSld modSld">
+      <pc:chgData name="gsierrar14@outlook.com" userId="fb2f282ce878086b" providerId="LiveId" clId="{9B9C0534-58FC-4869-9946-ACB12500E633}" dt="2025-02-05T17:34:28.654" v="33" actId="20577"/>
+      <pc:docMkLst>
+        <pc:docMk/>
+      </pc:docMkLst>
+      <pc:sldChg chg="modSp mod">
+        <pc:chgData name="gsierrar14@outlook.com" userId="fb2f282ce878086b" providerId="LiveId" clId="{9B9C0534-58FC-4869-9946-ACB12500E633}" dt="2025-02-05T17:34:28.654" v="33" actId="20577"/>
+        <pc:sldMkLst>
+          <pc:docMk/>
+          <pc:sldMk cId="3544933023" sldId="258"/>
+        </pc:sldMkLst>
+        <pc:spChg chg="mod">
+          <ac:chgData name="gsierrar14@outlook.com" userId="fb2f282ce878086b" providerId="LiveId" clId="{9B9C0534-58FC-4869-9946-ACB12500E633}" dt="2025-02-05T17:34:28.654" v="33" actId="20577"/>
+          <ac:spMkLst>
+            <pc:docMk/>
+            <pc:sldMk cId="3544933023" sldId="258"/>
+            <ac:spMk id="2" creationId="{D22C7101-717E-1B5A-81A8-B3F7996053E2}"/>
+          </ac:spMkLst>
+        </pc:spChg>
+      </pc:sldChg>
+      <pc:sldChg chg="addSp delSp modSp new mod">
+        <pc:chgData name="gsierrar14@outlook.com" userId="fb2f282ce878086b" providerId="LiveId" clId="{9B9C0534-58FC-4869-9946-ACB12500E633}" dt="2025-02-05T17:34:25.005" v="32" actId="1076"/>
+        <pc:sldMkLst>
+          <pc:docMk/>
+          <pc:sldMk cId="884596730" sldId="261"/>
+        </pc:sldMkLst>
+        <pc:spChg chg="mod">
+          <ac:chgData name="gsierrar14@outlook.com" userId="fb2f282ce878086b" providerId="LiveId" clId="{9B9C0534-58FC-4869-9946-ACB12500E633}" dt="2025-02-05T17:33:58.533" v="27" actId="20577"/>
+          <ac:spMkLst>
+            <pc:docMk/>
+            <pc:sldMk cId="884596730" sldId="261"/>
+            <ac:spMk id="2" creationId="{090131A0-B786-FAC7-8332-873AA0F6C934}"/>
+          </ac:spMkLst>
+        </pc:spChg>
+        <pc:spChg chg="del">
+          <ac:chgData name="gsierrar14@outlook.com" userId="fb2f282ce878086b" providerId="LiveId" clId="{9B9C0534-58FC-4869-9946-ACB12500E633}" dt="2025-02-05T17:34:17.301" v="28" actId="22"/>
+          <ac:spMkLst>
+            <pc:docMk/>
+            <pc:sldMk cId="884596730" sldId="261"/>
+            <ac:spMk id="3" creationId="{8ACF1D41-3FEF-663F-4973-A4B72D885684}"/>
+          </ac:spMkLst>
+        </pc:spChg>
+        <pc:picChg chg="add mod ord">
+          <ac:chgData name="gsierrar14@outlook.com" userId="fb2f282ce878086b" providerId="LiveId" clId="{9B9C0534-58FC-4869-9946-ACB12500E633}" dt="2025-02-05T17:34:25.005" v="32" actId="1076"/>
+          <ac:picMkLst>
+            <pc:docMk/>
+            <pc:sldMk cId="884596730" sldId="261"/>
+            <ac:picMk id="5" creationId="{21AC23F5-5547-F958-774A-81FD6AA70E20}"/>
+          </ac:picMkLst>
+        </pc:picChg>
+      </pc:sldChg>
+      <pc:sldChg chg="new del">
+        <pc:chgData name="gsierrar14@outlook.com" userId="fb2f282ce878086b" providerId="LiveId" clId="{9B9C0534-58FC-4869-9946-ACB12500E633}" dt="2025-02-05T17:33:20.980" v="1" actId="47"/>
+        <pc:sldMkLst>
+          <pc:docMk/>
+          <pc:sldMk cId="1141902732" sldId="261"/>
+        </pc:sldMkLst>
+      </pc:sldChg>
+    </pc:docChg>
+  </pc:docChgLst>
+</pc:chgInfo>
 </file>
 
 <file path=ppt/slideLayouts/slideLayout1.xml><?xml version="1.0" encoding="utf-8"?>
@@ -267,7 +340,7 @@
           <a:p>
             <a:fld id="{3391A759-BFF8-4B5B-9ECE-D93AC303B331}" type="datetime1">
               <a:rPr lang="en-US" smtClean="0"/>
-              <a:t>1/31/2025</a:t>
+              <a:t>2/5/2025</a:t>
             </a:fld>
             <a:endParaRPr lang="en-US"/>
           </a:p>
@@ -521,7 +594,7 @@
           <a:p>
             <a:fld id="{6DFDF398-5DA3-4937-BE3F-7CA1B9158252}" type="datetime1">
               <a:rPr lang="en-US" smtClean="0"/>
-              <a:t>1/31/2025</a:t>
+              <a:t>2/5/2025</a:t>
             </a:fld>
             <a:endParaRPr lang="en-US"/>
           </a:p>
@@ -731,7 +804,7 @@
           <a:p>
             <a:fld id="{8F191ED9-F929-4A92-90F9-3C9C84ABBE83}" type="datetime1">
               <a:rPr lang="en-US" smtClean="0"/>
-              <a:t>1/31/2025</a:t>
+              <a:t>2/5/2025</a:t>
             </a:fld>
             <a:endParaRPr lang="en-US"/>
           </a:p>
@@ -986,7 +1059,7 @@
           <a:p>
             <a:fld id="{EEBAB316-A2E6-49F2-825C-64AA951E4184}" type="datetime1">
               <a:rPr lang="en-US" smtClean="0"/>
-              <a:t>1/31/2025</a:t>
+              <a:t>2/5/2025</a:t>
             </a:fld>
             <a:endParaRPr lang="en-US"/>
           </a:p>
@@ -1264,7 +1337,7 @@
           <a:p>
             <a:fld id="{5AE9748B-ADD6-4C5A-8C2A-A39721276E74}" type="datetime1">
               <a:rPr lang="en-US" smtClean="0"/>
-              <a:t>1/31/2025</a:t>
+              <a:t>2/5/2025</a:t>
             </a:fld>
             <a:endParaRPr lang="en-US"/>
           </a:p>
@@ -1536,7 +1609,7 @@
           <a:p>
             <a:fld id="{7241FB0F-3C5C-4949-B933-9C7E511ED094}" type="datetime1">
               <a:rPr lang="en-US" smtClean="0"/>
-              <a:t>1/31/2025</a:t>
+              <a:t>2/5/2025</a:t>
             </a:fld>
             <a:endParaRPr lang="en-US"/>
           </a:p>
@@ -2024,7 +2097,7 @@
           <a:p>
             <a:fld id="{C2F01D58-E949-4BCB-829A-BBF80E38D59C}" type="datetime1">
               <a:rPr lang="en-US" smtClean="0"/>
-              <a:t>1/31/2025</a:t>
+              <a:t>2/5/2025</a:t>
             </a:fld>
             <a:endParaRPr lang="en-US"/>
           </a:p>
@@ -2166,7 +2239,7 @@
           <a:p>
             <a:fld id="{FF10A846-0DA4-4D92-9BF1-DE8C52C1F4DF}" type="datetime1">
               <a:rPr lang="en-US" smtClean="0"/>
-              <a:t>1/31/2025</a:t>
+              <a:t>2/5/2025</a:t>
             </a:fld>
             <a:endParaRPr lang="en-US"/>
           </a:p>
@@ -2279,7 +2352,7 @@
           <a:p>
             <a:fld id="{E9412331-4A9C-472F-A7FA-968157338839}" type="datetime1">
               <a:rPr lang="en-US" smtClean="0"/>
-              <a:t>1/31/2025</a:t>
+              <a:t>2/5/2025</a:t>
             </a:fld>
             <a:endParaRPr lang="en-US"/>
           </a:p>
@@ -2598,7 +2671,7 @@
           <a:p>
             <a:fld id="{A2197F3D-ED52-43FD-A26D-318B71534485}" type="datetime1">
               <a:rPr lang="en-US" smtClean="0"/>
-              <a:t>1/31/2025</a:t>
+              <a:t>2/5/2025</a:t>
             </a:fld>
             <a:endParaRPr lang="en-US"/>
           </a:p>
@@ -2895,7 +2968,7 @@
           <a:p>
             <a:fld id="{3D291FA4-6264-4BB8-B3B5-77711EED2D82}" type="datetime1">
               <a:rPr lang="en-US" smtClean="0"/>
-              <a:t>1/31/2025</a:t>
+              <a:t>2/5/2025</a:t>
             </a:fld>
             <a:endParaRPr lang="en-US"/>
           </a:p>
@@ -3136,7 +3209,7 @@
           <a:p>
             <a:fld id="{E7F6A1D9-D323-4F4E-8655-25E2D32CE742}" type="datetime1">
               <a:rPr lang="en-US" smtClean="0"/>
-              <a:t>1/31/2025</a:t>
+              <a:t>2/5/2025</a:t>
             </a:fld>
             <a:endParaRPr lang="en-US"/>
           </a:p>
@@ -4301,7 +4374,7 @@
           <a:p>
             <a:r>
               <a:rPr lang="es-CO" dirty="0"/>
-              <a:t>ASAT 2 &amp; 3</a:t>
+              <a:t>ASAT3 2 &amp; 3</a:t>
             </a:r>
             <a:endParaRPr lang="en-US" dirty="0"/>
           </a:p>
@@ -4372,6 +4445,94 @@
           <p:cNvPr id="2" name="Title 1">
             <a:extLst>
               <a:ext uri="{FF2B5EF4-FFF2-40B4-BE49-F238E27FC236}">
+                <a16:creationId xmlns:a16="http://schemas.microsoft.com/office/drawing/2014/main" id="{090131A0-B786-FAC7-8332-873AA0F6C934}"/>
+              </a:ext>
+            </a:extLst>
+          </p:cNvPr>
+          <p:cNvSpPr>
+            <a:spLocks noGrp="1"/>
+          </p:cNvSpPr>
+          <p:nvPr>
+            <p:ph type="title"/>
+          </p:nvPr>
+        </p:nvSpPr>
+        <p:spPr/>
+        <p:txBody>
+          <a:bodyPr/>
+          <a:lstStyle/>
+          <a:p>
+            <a:r>
+              <a:rPr lang="es-CO" dirty="0"/>
+              <a:t>ASAT3_5 CHR 7</a:t>
+            </a:r>
+            <a:endParaRPr lang="en-US" dirty="0"/>
+          </a:p>
+        </p:txBody>
+      </p:sp>
+      <p:pic>
+        <p:nvPicPr>
+          <p:cNvPr id="5" name="Content Placeholder 4">
+            <a:extLst>
+              <a:ext uri="{FF2B5EF4-FFF2-40B4-BE49-F238E27FC236}">
+                <a16:creationId xmlns:a16="http://schemas.microsoft.com/office/drawing/2014/main" id="{21AC23F5-5547-F958-774A-81FD6AA70E20}"/>
+              </a:ext>
+            </a:extLst>
+          </p:cNvPr>
+          <p:cNvPicPr>
+            <a:picLocks noGrp="1" noChangeAspect="1"/>
+          </p:cNvPicPr>
+          <p:nvPr>
+            <p:ph idx="1"/>
+          </p:nvPr>
+        </p:nvPicPr>
+        <p:blipFill>
+          <a:blip r:embed="rId2"/>
+          <a:stretch>
+            <a:fillRect/>
+          </a:stretch>
+        </p:blipFill>
+        <p:spPr>
+          <a:xfrm>
+            <a:off x="263817" y="2913652"/>
+            <a:ext cx="11664365" cy="2643087"/>
+          </a:xfrm>
+        </p:spPr>
+      </p:pic>
+    </p:spTree>
+    <p:extLst>
+      <p:ext uri="{BB962C8B-B14F-4D97-AF65-F5344CB8AC3E}">
+        <p14:creationId xmlns:p14="http://schemas.microsoft.com/office/powerpoint/2010/main" val="884596730"/>
+      </p:ext>
+    </p:extLst>
+  </p:cSld>
+  <p:clrMapOvr>
+    <a:masterClrMapping/>
+  </p:clrMapOvr>
+</p:sld>
+</file>
+
+<file path=ppt/slides/slide5.xml><?xml version="1.0" encoding="utf-8"?>
+<p:sld xmlns:a="http://schemas.openxmlformats.org/drawingml/2006/main" xmlns:r="http://schemas.openxmlformats.org/officeDocument/2006/relationships" xmlns:p="http://schemas.openxmlformats.org/presentationml/2006/main">
+  <p:cSld>
+    <p:spTree>
+      <p:nvGrpSpPr>
+        <p:cNvPr id="1" name=""/>
+        <p:cNvGrpSpPr/>
+        <p:nvPr/>
+      </p:nvGrpSpPr>
+      <p:grpSpPr>
+        <a:xfrm>
+          <a:off x="0" y="0"/>
+          <a:ext cx="0" cy="0"/>
+          <a:chOff x="0" y="0"/>
+          <a:chExt cx="0" cy="0"/>
+        </a:xfrm>
+      </p:grpSpPr>
+      <p:sp>
+        <p:nvSpPr>
+          <p:cNvPr id="2" name="Title 1">
+            <a:extLst>
+              <a:ext uri="{FF2B5EF4-FFF2-40B4-BE49-F238E27FC236}">
                 <a16:creationId xmlns:a16="http://schemas.microsoft.com/office/drawing/2014/main" id="{F42B56F8-D2F8-0E5E-F4A9-C156635FA210}"/>
               </a:ext>
             </a:extLst>
@@ -4439,7 +4600,7 @@
 </p:sld>
 </file>
 
-<file path=ppt/slides/slide5.xml><?xml version="1.0" encoding="utf-8"?>
+<file path=ppt/slides/slide6.xml><?xml version="1.0" encoding="utf-8"?>
 <p:sld xmlns:a="http://schemas.openxmlformats.org/drawingml/2006/main" xmlns:r="http://schemas.openxmlformats.org/officeDocument/2006/relationships" xmlns:p="http://schemas.openxmlformats.org/presentationml/2006/main">
   <p:cSld>
     <p:spTree>

</xml_diff>